<commit_message>
diagram revision to EN
</commit_message>
<xml_diff>
--- a/assets/documents/EDS-Diagram.pptx
+++ b/assets/documents/EDS-Diagram.pptx
@@ -6,6 +6,7 @@
   </p:sldMasterIdLst>
   <p:sldIdLst>
     <p:sldId id="256" r:id="rId3"/>
+    <p:sldId id="257" r:id="rId4"/>
   </p:sldIdLst>
   <p:sldSz cx="12192000" cy="6858000"/>
   <p:notesSz cx="7103745" cy="10234295"/>
@@ -4054,6 +4055,1472 @@
 </p:sld>
 </file>
 
+<file path=ppt/slides/slide2.xml><?xml version="1.0" encoding="utf-8"?>
+<p:sld xmlns:a="http://schemas.openxmlformats.org/drawingml/2006/main" xmlns:r="http://schemas.openxmlformats.org/officeDocument/2006/relationships" xmlns:p="http://schemas.openxmlformats.org/presentationml/2006/main">
+  <p:cSld>
+    <p:spTree>
+      <p:nvGrpSpPr>
+        <p:cNvPr id="1" name=""/>
+        <p:cNvGrpSpPr/>
+        <p:nvPr/>
+      </p:nvGrpSpPr>
+      <p:grpSpPr/>
+      <p:sp>
+        <p:nvSpPr>
+          <p:cNvPr id="4" name="Rectangle 3"/>
+          <p:cNvSpPr/>
+          <p:nvPr/>
+        </p:nvSpPr>
+        <p:spPr>
+          <a:xfrm>
+            <a:off x="1849755" y="2037715"/>
+            <a:ext cx="1550035" cy="865505"/>
+          </a:xfrm>
+          <a:prstGeom prst="rect">
+            <a:avLst/>
+          </a:prstGeom>
+          <a:ln>
+            <a:noFill/>
+          </a:ln>
+        </p:spPr>
+        <p:style>
+          <a:lnRef idx="2">
+            <a:schemeClr val="accent1">
+              <a:shade val="50000"/>
+            </a:schemeClr>
+          </a:lnRef>
+          <a:fillRef idx="1">
+            <a:schemeClr val="accent1"/>
+          </a:fillRef>
+          <a:effectRef idx="0">
+            <a:schemeClr val="accent1"/>
+          </a:effectRef>
+          <a:fontRef idx="minor">
+            <a:schemeClr val="lt1"/>
+          </a:fontRef>
+        </p:style>
+        <p:txBody>
+          <a:bodyPr rtlCol="0" anchor="ctr"/>
+          <a:p>
+            <a:pPr algn="ctr"/>
+            <a:endParaRPr lang="en-US" b="1">
+              <a:ln>
+                <a:noFill/>
+              </a:ln>
+            </a:endParaRPr>
+          </a:p>
+        </p:txBody>
+      </p:sp>
+      <p:sp>
+        <p:nvSpPr>
+          <p:cNvPr id="6" name="Text Box 5"/>
+          <p:cNvSpPr txBox="1"/>
+          <p:nvPr/>
+        </p:nvSpPr>
+        <p:spPr>
+          <a:xfrm>
+            <a:off x="1891665" y="2286000"/>
+            <a:ext cx="1467485" cy="368300"/>
+          </a:xfrm>
+          <a:prstGeom prst="rect">
+            <a:avLst/>
+          </a:prstGeom>
+          <a:noFill/>
+        </p:spPr>
+        <p:txBody>
+          <a:bodyPr wrap="square" rtlCol="0" anchor="t">
+            <a:spAutoFit/>
+          </a:bodyPr>
+          <a:p>
+            <a:r>
+              <a:rPr lang="en-US" altLang="zh-CN" b="1">
+                <a:solidFill>
+                  <a:schemeClr val="bg1"/>
+                </a:solidFill>
+                <a:latin typeface="微软雅黑" panose="020B0503020204020204" charset="-122"/>
+                <a:ea typeface="微软雅黑" panose="020B0503020204020204" charset="-122"/>
+              </a:rPr>
+              <a:t>Solar focus</a:t>
+            </a:r>
+            <a:endParaRPr lang="en-US" altLang="zh-CN" b="1">
+              <a:solidFill>
+                <a:schemeClr val="bg1"/>
+              </a:solidFill>
+              <a:latin typeface="微软雅黑" panose="020B0503020204020204" charset="-122"/>
+              <a:ea typeface="微软雅黑" panose="020B0503020204020204" charset="-122"/>
+            </a:endParaRPr>
+          </a:p>
+        </p:txBody>
+      </p:sp>
+      <p:sp>
+        <p:nvSpPr>
+          <p:cNvPr id="7" name="Rectangle 6"/>
+          <p:cNvSpPr/>
+          <p:nvPr/>
+        </p:nvSpPr>
+        <p:spPr>
+          <a:xfrm>
+            <a:off x="3707130" y="2037080"/>
+            <a:ext cx="1550035" cy="865505"/>
+          </a:xfrm>
+          <a:prstGeom prst="rect">
+            <a:avLst/>
+          </a:prstGeom>
+          <a:ln>
+            <a:noFill/>
+          </a:ln>
+        </p:spPr>
+        <p:style>
+          <a:lnRef idx="2">
+            <a:schemeClr val="accent1">
+              <a:shade val="50000"/>
+            </a:schemeClr>
+          </a:lnRef>
+          <a:fillRef idx="1">
+            <a:schemeClr val="accent1"/>
+          </a:fillRef>
+          <a:effectRef idx="0">
+            <a:schemeClr val="accent1"/>
+          </a:effectRef>
+          <a:fontRef idx="minor">
+            <a:schemeClr val="lt1"/>
+          </a:fontRef>
+        </p:style>
+        <p:txBody>
+          <a:bodyPr rtlCol="0" anchor="ctr"/>
+          <a:p>
+            <a:pPr algn="ctr"/>
+            <a:endParaRPr lang="en-US" b="1">
+              <a:ln>
+                <a:noFill/>
+              </a:ln>
+            </a:endParaRPr>
+          </a:p>
+        </p:txBody>
+      </p:sp>
+      <p:sp>
+        <p:nvSpPr>
+          <p:cNvPr id="8" name="Text Box 7"/>
+          <p:cNvSpPr txBox="1"/>
+          <p:nvPr/>
+        </p:nvSpPr>
+        <p:spPr>
+          <a:xfrm>
+            <a:off x="3846195" y="2285365"/>
+            <a:ext cx="1271270" cy="368300"/>
+          </a:xfrm>
+          <a:prstGeom prst="rect">
+            <a:avLst/>
+          </a:prstGeom>
+          <a:noFill/>
+        </p:spPr>
+        <p:txBody>
+          <a:bodyPr wrap="square" rtlCol="0" anchor="t">
+            <a:spAutoFit/>
+          </a:bodyPr>
+          <a:p>
+            <a:r>
+              <a:rPr lang="zh-CN" b="1">
+                <a:solidFill>
+                  <a:schemeClr val="bg1"/>
+                </a:solidFill>
+                <a:latin typeface="微软雅黑" panose="020B0503020204020204" charset="-122"/>
+                <a:ea typeface="微软雅黑" panose="020B0503020204020204" charset="-122"/>
+              </a:rPr>
+              <a:t>Smelting  </a:t>
+            </a:r>
+            <a:endParaRPr lang="zh-CN" b="1">
+              <a:solidFill>
+                <a:schemeClr val="bg1"/>
+              </a:solidFill>
+              <a:latin typeface="微软雅黑" panose="020B0503020204020204" charset="-122"/>
+              <a:ea typeface="微软雅黑" panose="020B0503020204020204" charset="-122"/>
+            </a:endParaRPr>
+          </a:p>
+        </p:txBody>
+      </p:sp>
+      <p:sp>
+        <p:nvSpPr>
+          <p:cNvPr id="9" name="Rectangle 8"/>
+          <p:cNvSpPr/>
+          <p:nvPr/>
+        </p:nvSpPr>
+        <p:spPr>
+          <a:xfrm>
+            <a:off x="5556885" y="2037715"/>
+            <a:ext cx="1550035" cy="865505"/>
+          </a:xfrm>
+          <a:prstGeom prst="rect">
+            <a:avLst/>
+          </a:prstGeom>
+          <a:ln>
+            <a:noFill/>
+          </a:ln>
+        </p:spPr>
+        <p:style>
+          <a:lnRef idx="2">
+            <a:schemeClr val="accent1">
+              <a:shade val="50000"/>
+            </a:schemeClr>
+          </a:lnRef>
+          <a:fillRef idx="1">
+            <a:schemeClr val="accent1"/>
+          </a:fillRef>
+          <a:effectRef idx="0">
+            <a:schemeClr val="accent1"/>
+          </a:effectRef>
+          <a:fontRef idx="minor">
+            <a:schemeClr val="lt1"/>
+          </a:fontRef>
+        </p:style>
+        <p:txBody>
+          <a:bodyPr rtlCol="0" anchor="ctr"/>
+          <a:p>
+            <a:pPr algn="ctr"/>
+            <a:endParaRPr lang="en-US" b="1">
+              <a:ln>
+                <a:noFill/>
+              </a:ln>
+            </a:endParaRPr>
+          </a:p>
+        </p:txBody>
+      </p:sp>
+      <p:sp>
+        <p:nvSpPr>
+          <p:cNvPr id="10" name="Text Box 9"/>
+          <p:cNvSpPr txBox="1"/>
+          <p:nvPr/>
+        </p:nvSpPr>
+        <p:spPr>
+          <a:xfrm>
+            <a:off x="5750560" y="2284730"/>
+            <a:ext cx="1162685" cy="368300"/>
+          </a:xfrm>
+          <a:prstGeom prst="rect">
+            <a:avLst/>
+          </a:prstGeom>
+          <a:noFill/>
+        </p:spPr>
+        <p:txBody>
+          <a:bodyPr wrap="square" rtlCol="0" anchor="t">
+            <a:spAutoFit/>
+          </a:bodyPr>
+          <a:p>
+            <a:r>
+              <a:rPr lang="en-US" altLang="zh-CN" b="1">
+                <a:solidFill>
+                  <a:schemeClr val="bg1"/>
+                </a:solidFill>
+                <a:latin typeface="微软雅黑" panose="020B0503020204020204" charset="-122"/>
+                <a:ea typeface="微软雅黑" panose="020B0503020204020204" charset="-122"/>
+                <a:sym typeface="+mn-ea"/>
+              </a:rPr>
+              <a:t>F</a:t>
+            </a:r>
+            <a:r>
+              <a:rPr lang="zh-CN" b="1">
+                <a:solidFill>
+                  <a:schemeClr val="bg1"/>
+                </a:solidFill>
+                <a:latin typeface="微软雅黑" panose="020B0503020204020204" charset="-122"/>
+                <a:ea typeface="微软雅黑" panose="020B0503020204020204" charset="-122"/>
+                <a:sym typeface="+mn-ea"/>
+              </a:rPr>
+              <a:t>orming</a:t>
+            </a:r>
+            <a:endParaRPr lang="zh-CN" b="1">
+              <a:solidFill>
+                <a:schemeClr val="bg1"/>
+              </a:solidFill>
+              <a:latin typeface="微软雅黑" panose="020B0503020204020204" charset="-122"/>
+              <a:ea typeface="微软雅黑" panose="020B0503020204020204" charset="-122"/>
+            </a:endParaRPr>
+          </a:p>
+        </p:txBody>
+      </p:sp>
+      <p:sp>
+        <p:nvSpPr>
+          <p:cNvPr id="11" name="Rectangle 10"/>
+          <p:cNvSpPr/>
+          <p:nvPr/>
+        </p:nvSpPr>
+        <p:spPr>
+          <a:xfrm>
+            <a:off x="7406640" y="2036445"/>
+            <a:ext cx="1550035" cy="865505"/>
+          </a:xfrm>
+          <a:prstGeom prst="rect">
+            <a:avLst/>
+          </a:prstGeom>
+          <a:ln>
+            <a:noFill/>
+          </a:ln>
+        </p:spPr>
+        <p:style>
+          <a:lnRef idx="2">
+            <a:schemeClr val="accent1">
+              <a:shade val="50000"/>
+            </a:schemeClr>
+          </a:lnRef>
+          <a:fillRef idx="1">
+            <a:schemeClr val="accent1"/>
+          </a:fillRef>
+          <a:effectRef idx="0">
+            <a:schemeClr val="accent1"/>
+          </a:effectRef>
+          <a:fontRef idx="minor">
+            <a:schemeClr val="lt1"/>
+          </a:fontRef>
+        </p:style>
+        <p:txBody>
+          <a:bodyPr rtlCol="0" anchor="ctr"/>
+          <a:p>
+            <a:pPr algn="ctr"/>
+            <a:endParaRPr lang="en-US" b="1">
+              <a:ln>
+                <a:noFill/>
+              </a:ln>
+            </a:endParaRPr>
+          </a:p>
+        </p:txBody>
+      </p:sp>
+      <p:sp>
+        <p:nvSpPr>
+          <p:cNvPr id="12" name="Text Box 11"/>
+          <p:cNvSpPr txBox="1"/>
+          <p:nvPr/>
+        </p:nvSpPr>
+        <p:spPr>
+          <a:xfrm>
+            <a:off x="7406640" y="2146300"/>
+            <a:ext cx="1574165" cy="645160"/>
+          </a:xfrm>
+          <a:prstGeom prst="rect">
+            <a:avLst/>
+          </a:prstGeom>
+          <a:noFill/>
+        </p:spPr>
+        <p:txBody>
+          <a:bodyPr wrap="square" rtlCol="0" anchor="t">
+            <a:spAutoFit/>
+          </a:bodyPr>
+          <a:p>
+            <a:r>
+              <a:rPr lang="en-US" altLang="zh-CN" b="1">
+                <a:solidFill>
+                  <a:schemeClr val="bg1"/>
+                </a:solidFill>
+                <a:latin typeface="微软雅黑" panose="020B0503020204020204" charset="-122"/>
+                <a:ea typeface="微软雅黑" panose="020B0503020204020204" charset="-122"/>
+              </a:rPr>
+              <a:t>Assembling</a:t>
+            </a:r>
+            <a:endParaRPr lang="en-US" altLang="zh-CN" b="1">
+              <a:solidFill>
+                <a:schemeClr val="bg1"/>
+              </a:solidFill>
+              <a:latin typeface="微软雅黑" panose="020B0503020204020204" charset="-122"/>
+              <a:ea typeface="微软雅黑" panose="020B0503020204020204" charset="-122"/>
+            </a:endParaRPr>
+          </a:p>
+          <a:p>
+            <a:r>
+              <a:rPr lang="en-US" altLang="zh-CN" b="1">
+                <a:solidFill>
+                  <a:schemeClr val="bg1"/>
+                </a:solidFill>
+                <a:latin typeface="微软雅黑" panose="020B0503020204020204" charset="-122"/>
+                <a:ea typeface="微软雅黑" panose="020B0503020204020204" charset="-122"/>
+              </a:rPr>
+              <a:t>Duplicate</a:t>
+            </a:r>
+            <a:endParaRPr lang="en-US" altLang="zh-CN" b="1">
+              <a:solidFill>
+                <a:schemeClr val="bg1"/>
+              </a:solidFill>
+              <a:latin typeface="微软雅黑" panose="020B0503020204020204" charset="-122"/>
+              <a:ea typeface="微软雅黑" panose="020B0503020204020204" charset="-122"/>
+            </a:endParaRPr>
+          </a:p>
+        </p:txBody>
+      </p:sp>
+      <p:sp>
+        <p:nvSpPr>
+          <p:cNvPr id="13" name="Rectangle 12"/>
+          <p:cNvSpPr/>
+          <p:nvPr/>
+        </p:nvSpPr>
+        <p:spPr>
+          <a:xfrm>
+            <a:off x="8430895" y="3220085"/>
+            <a:ext cx="1269365" cy="584835"/>
+          </a:xfrm>
+          <a:prstGeom prst="rect">
+            <a:avLst/>
+          </a:prstGeom>
+        </p:spPr>
+        <p:style>
+          <a:lnRef idx="3">
+            <a:schemeClr val="lt1"/>
+          </a:lnRef>
+          <a:fillRef idx="1">
+            <a:schemeClr val="accent6"/>
+          </a:fillRef>
+          <a:effectRef idx="1">
+            <a:schemeClr val="accent6"/>
+          </a:effectRef>
+          <a:fontRef idx="minor">
+            <a:schemeClr val="lt1"/>
+          </a:fontRef>
+        </p:style>
+        <p:txBody>
+          <a:bodyPr rtlCol="0" anchor="ctr"/>
+          <a:p>
+            <a:pPr algn="ctr"/>
+            <a:endParaRPr lang="en-US" b="1">
+              <a:ln>
+                <a:noFill/>
+              </a:ln>
+            </a:endParaRPr>
+          </a:p>
+        </p:txBody>
+      </p:sp>
+      <p:sp>
+        <p:nvSpPr>
+          <p:cNvPr id="14" name="Text Box 13"/>
+          <p:cNvSpPr txBox="1"/>
+          <p:nvPr/>
+        </p:nvSpPr>
+        <p:spPr>
+          <a:xfrm>
+            <a:off x="8430895" y="3251835"/>
+            <a:ext cx="1558290" cy="521970"/>
+          </a:xfrm>
+          <a:prstGeom prst="rect">
+            <a:avLst/>
+          </a:prstGeom>
+          <a:noFill/>
+        </p:spPr>
+        <p:txBody>
+          <a:bodyPr wrap="square" rtlCol="0" anchor="t">
+            <a:spAutoFit/>
+          </a:bodyPr>
+          <a:p>
+            <a:r>
+              <a:rPr lang="en-US" altLang="zh-CN" sz="1400" b="1">
+                <a:solidFill>
+                  <a:schemeClr val="bg1"/>
+                </a:solidFill>
+                <a:latin typeface="微软雅黑" panose="020B0503020204020204" charset="-122"/>
+                <a:ea typeface="微软雅黑" panose="020B0503020204020204" charset="-122"/>
+              </a:rPr>
+              <a:t>Solar </a:t>
+            </a:r>
+            <a:endParaRPr lang="en-US" altLang="zh-CN" sz="1400" b="1">
+              <a:solidFill>
+                <a:schemeClr val="bg1"/>
+              </a:solidFill>
+              <a:latin typeface="微软雅黑" panose="020B0503020204020204" charset="-122"/>
+              <a:ea typeface="微软雅黑" panose="020B0503020204020204" charset="-122"/>
+            </a:endParaRPr>
+          </a:p>
+          <a:p>
+            <a:r>
+              <a:rPr lang="en-US" altLang="zh-CN" sz="1400" b="1">
+                <a:solidFill>
+                  <a:schemeClr val="bg1"/>
+                </a:solidFill>
+                <a:latin typeface="微软雅黑" panose="020B0503020204020204" charset="-122"/>
+                <a:ea typeface="微软雅黑" panose="020B0503020204020204" charset="-122"/>
+              </a:rPr>
+              <a:t>furnace</a:t>
+            </a:r>
+            <a:endParaRPr lang="en-US" altLang="zh-CN" sz="1400" b="1">
+              <a:solidFill>
+                <a:schemeClr val="bg1"/>
+              </a:solidFill>
+              <a:latin typeface="微软雅黑" panose="020B0503020204020204" charset="-122"/>
+              <a:ea typeface="微软雅黑" panose="020B0503020204020204" charset="-122"/>
+            </a:endParaRPr>
+          </a:p>
+        </p:txBody>
+      </p:sp>
+      <p:cxnSp>
+        <p:nvCxnSpPr>
+          <p:cNvPr id="17" name="Straight Arrow Connector 16"/>
+          <p:cNvCxnSpPr/>
+          <p:nvPr/>
+        </p:nvCxnSpPr>
+        <p:spPr>
+          <a:xfrm>
+            <a:off x="7902575" y="3510280"/>
+            <a:ext cx="561340" cy="5080"/>
+          </a:xfrm>
+          <a:prstGeom prst="straightConnector1">
+            <a:avLst/>
+          </a:prstGeom>
+          <a:ln w="50800" cmpd="sng">
+            <a:solidFill>
+              <a:schemeClr val="bg1">
+                <a:lumMod val="65000"/>
+              </a:schemeClr>
+            </a:solidFill>
+            <a:prstDash val="solid"/>
+            <a:tailEnd type="triangle" w="med" len="lg"/>
+          </a:ln>
+        </p:spPr>
+        <p:style>
+          <a:lnRef idx="1">
+            <a:schemeClr val="accent1"/>
+          </a:lnRef>
+          <a:fillRef idx="0">
+            <a:schemeClr val="accent1"/>
+          </a:fillRef>
+          <a:effectRef idx="0">
+            <a:schemeClr val="accent1"/>
+          </a:effectRef>
+          <a:fontRef idx="minor">
+            <a:schemeClr val="tx1"/>
+          </a:fontRef>
+        </p:style>
+      </p:cxnSp>
+      <p:cxnSp>
+        <p:nvCxnSpPr>
+          <p:cNvPr id="18" name="Straight Arrow Connector 17"/>
+          <p:cNvCxnSpPr/>
+          <p:nvPr/>
+        </p:nvCxnSpPr>
+        <p:spPr>
+          <a:xfrm flipH="1" flipV="1">
+            <a:off x="7914640" y="2898775"/>
+            <a:ext cx="1270" cy="2222500"/>
+          </a:xfrm>
+          <a:prstGeom prst="straightConnector1">
+            <a:avLst/>
+          </a:prstGeom>
+          <a:ln w="50800" cmpd="sng">
+            <a:solidFill>
+              <a:schemeClr val="bg1">
+                <a:lumMod val="65000"/>
+              </a:schemeClr>
+            </a:solidFill>
+            <a:prstDash val="solid"/>
+            <a:tailEnd type="none" w="med" len="lg"/>
+          </a:ln>
+        </p:spPr>
+        <p:style>
+          <a:lnRef idx="1">
+            <a:schemeClr val="accent1"/>
+          </a:lnRef>
+          <a:fillRef idx="0">
+            <a:schemeClr val="accent1"/>
+          </a:fillRef>
+          <a:effectRef idx="0">
+            <a:schemeClr val="accent1"/>
+          </a:effectRef>
+          <a:fontRef idx="minor">
+            <a:schemeClr val="tx1"/>
+          </a:fontRef>
+        </p:style>
+      </p:cxnSp>
+      <p:sp>
+        <p:nvSpPr>
+          <p:cNvPr id="23" name="Rectangle 22"/>
+          <p:cNvSpPr/>
+          <p:nvPr/>
+        </p:nvSpPr>
+        <p:spPr>
+          <a:xfrm>
+            <a:off x="6505575" y="3220085"/>
+            <a:ext cx="1269365" cy="584835"/>
+          </a:xfrm>
+          <a:prstGeom prst="rect">
+            <a:avLst/>
+          </a:prstGeom>
+        </p:spPr>
+        <p:style>
+          <a:lnRef idx="3">
+            <a:schemeClr val="lt1"/>
+          </a:lnRef>
+          <a:fillRef idx="1">
+            <a:schemeClr val="accent6"/>
+          </a:fillRef>
+          <a:effectRef idx="1">
+            <a:schemeClr val="accent6"/>
+          </a:effectRef>
+          <a:fontRef idx="minor">
+            <a:schemeClr val="lt1"/>
+          </a:fontRef>
+        </p:style>
+        <p:txBody>
+          <a:bodyPr rtlCol="0" anchor="ctr"/>
+          <a:p>
+            <a:pPr algn="ctr"/>
+            <a:endParaRPr lang="en-US" b="1">
+              <a:ln>
+                <a:noFill/>
+              </a:ln>
+            </a:endParaRPr>
+          </a:p>
+        </p:txBody>
+      </p:sp>
+      <p:sp>
+        <p:nvSpPr>
+          <p:cNvPr id="24" name="Text Box 23"/>
+          <p:cNvSpPr txBox="1"/>
+          <p:nvPr/>
+        </p:nvSpPr>
+        <p:spPr>
+          <a:xfrm>
+            <a:off x="6538595" y="3343910"/>
+            <a:ext cx="1202690" cy="306705"/>
+          </a:xfrm>
+          <a:prstGeom prst="rect">
+            <a:avLst/>
+          </a:prstGeom>
+          <a:noFill/>
+        </p:spPr>
+        <p:txBody>
+          <a:bodyPr wrap="square" rtlCol="0" anchor="t">
+            <a:spAutoFit/>
+          </a:bodyPr>
+          <a:p>
+            <a:r>
+              <a:rPr lang="en-US" sz="1400" b="1">
+                <a:solidFill>
+                  <a:schemeClr val="bg1"/>
+                </a:solidFill>
+                <a:latin typeface="微软雅黑" panose="020B0503020204020204" charset="-122"/>
+                <a:ea typeface="微软雅黑" panose="020B0503020204020204" charset="-122"/>
+              </a:rPr>
+              <a:t>Rolling</a:t>
+            </a:r>
+            <a:endParaRPr lang="en-US" sz="1400" b="1">
+              <a:solidFill>
+                <a:schemeClr val="bg1"/>
+              </a:solidFill>
+              <a:latin typeface="微软雅黑" panose="020B0503020204020204" charset="-122"/>
+              <a:ea typeface="微软雅黑" panose="020B0503020204020204" charset="-122"/>
+            </a:endParaRPr>
+          </a:p>
+        </p:txBody>
+      </p:sp>
+      <p:cxnSp>
+        <p:nvCxnSpPr>
+          <p:cNvPr id="25" name="Straight Arrow Connector 24"/>
+          <p:cNvCxnSpPr/>
+          <p:nvPr/>
+        </p:nvCxnSpPr>
+        <p:spPr>
+          <a:xfrm>
+            <a:off x="5977255" y="3510280"/>
+            <a:ext cx="561340" cy="5080"/>
+          </a:xfrm>
+          <a:prstGeom prst="straightConnector1">
+            <a:avLst/>
+          </a:prstGeom>
+          <a:ln w="50800" cmpd="sng">
+            <a:solidFill>
+              <a:schemeClr val="bg1">
+                <a:lumMod val="65000"/>
+              </a:schemeClr>
+            </a:solidFill>
+            <a:prstDash val="solid"/>
+            <a:tailEnd type="triangle" w="med" len="lg"/>
+          </a:ln>
+        </p:spPr>
+        <p:style>
+          <a:lnRef idx="1">
+            <a:schemeClr val="accent1"/>
+          </a:lnRef>
+          <a:fillRef idx="0">
+            <a:schemeClr val="accent1"/>
+          </a:fillRef>
+          <a:effectRef idx="0">
+            <a:schemeClr val="accent1"/>
+          </a:effectRef>
+          <a:fontRef idx="minor">
+            <a:schemeClr val="tx1"/>
+          </a:fontRef>
+        </p:style>
+      </p:cxnSp>
+      <p:cxnSp>
+        <p:nvCxnSpPr>
+          <p:cNvPr id="26" name="Straight Arrow Connector 25"/>
+          <p:cNvCxnSpPr/>
+          <p:nvPr/>
+        </p:nvCxnSpPr>
+        <p:spPr>
+          <a:xfrm flipV="1">
+            <a:off x="5993765" y="2898775"/>
+            <a:ext cx="4445" cy="2222500"/>
+          </a:xfrm>
+          <a:prstGeom prst="straightConnector1">
+            <a:avLst/>
+          </a:prstGeom>
+          <a:ln w="50800" cmpd="sng">
+            <a:solidFill>
+              <a:schemeClr val="bg1">
+                <a:lumMod val="65000"/>
+              </a:schemeClr>
+            </a:solidFill>
+            <a:prstDash val="solid"/>
+            <a:tailEnd type="none" w="med" len="lg"/>
+          </a:ln>
+        </p:spPr>
+        <p:style>
+          <a:lnRef idx="1">
+            <a:schemeClr val="accent1"/>
+          </a:lnRef>
+          <a:fillRef idx="0">
+            <a:schemeClr val="accent1"/>
+          </a:fillRef>
+          <a:effectRef idx="0">
+            <a:schemeClr val="accent1"/>
+          </a:effectRef>
+          <a:fontRef idx="minor">
+            <a:schemeClr val="tx1"/>
+          </a:fontRef>
+        </p:style>
+      </p:cxnSp>
+      <p:sp>
+        <p:nvSpPr>
+          <p:cNvPr id="27" name="Rectangle 26"/>
+          <p:cNvSpPr/>
+          <p:nvPr/>
+        </p:nvSpPr>
+        <p:spPr>
+          <a:xfrm>
+            <a:off x="6504940" y="4037965"/>
+            <a:ext cx="1269365" cy="584835"/>
+          </a:xfrm>
+          <a:prstGeom prst="rect">
+            <a:avLst/>
+          </a:prstGeom>
+        </p:spPr>
+        <p:style>
+          <a:lnRef idx="3">
+            <a:schemeClr val="lt1"/>
+          </a:lnRef>
+          <a:fillRef idx="1">
+            <a:schemeClr val="accent6"/>
+          </a:fillRef>
+          <a:effectRef idx="1">
+            <a:schemeClr val="accent6"/>
+          </a:effectRef>
+          <a:fontRef idx="minor">
+            <a:schemeClr val="lt1"/>
+          </a:fontRef>
+        </p:style>
+        <p:txBody>
+          <a:bodyPr rtlCol="0" anchor="ctr"/>
+          <a:p>
+            <a:pPr algn="ctr"/>
+            <a:endParaRPr lang="en-US" b="1">
+              <a:ln>
+                <a:noFill/>
+              </a:ln>
+            </a:endParaRPr>
+          </a:p>
+        </p:txBody>
+      </p:sp>
+      <p:sp>
+        <p:nvSpPr>
+          <p:cNvPr id="28" name="Text Box 27"/>
+          <p:cNvSpPr txBox="1"/>
+          <p:nvPr/>
+        </p:nvSpPr>
+        <p:spPr>
+          <a:xfrm>
+            <a:off x="6537960" y="4161790"/>
+            <a:ext cx="1202690" cy="306705"/>
+          </a:xfrm>
+          <a:prstGeom prst="rect">
+            <a:avLst/>
+          </a:prstGeom>
+          <a:noFill/>
+        </p:spPr>
+        <p:txBody>
+          <a:bodyPr wrap="square" rtlCol="0" anchor="t">
+            <a:spAutoFit/>
+          </a:bodyPr>
+          <a:p>
+            <a:r>
+              <a:rPr lang="en-US" sz="1400" b="1">
+                <a:solidFill>
+                  <a:schemeClr val="bg1"/>
+                </a:solidFill>
+                <a:latin typeface="微软雅黑" panose="020B0503020204020204" charset="-122"/>
+                <a:ea typeface="微软雅黑" panose="020B0503020204020204" charset="-122"/>
+              </a:rPr>
+              <a:t>Profile</a:t>
+            </a:r>
+            <a:endParaRPr lang="en-US" sz="1400" b="1">
+              <a:solidFill>
+                <a:schemeClr val="bg1"/>
+              </a:solidFill>
+              <a:latin typeface="微软雅黑" panose="020B0503020204020204" charset="-122"/>
+              <a:ea typeface="微软雅黑" panose="020B0503020204020204" charset="-122"/>
+            </a:endParaRPr>
+          </a:p>
+        </p:txBody>
+      </p:sp>
+      <p:cxnSp>
+        <p:nvCxnSpPr>
+          <p:cNvPr id="29" name="Straight Arrow Connector 28"/>
+          <p:cNvCxnSpPr/>
+          <p:nvPr/>
+        </p:nvCxnSpPr>
+        <p:spPr>
+          <a:xfrm>
+            <a:off x="5976620" y="4328160"/>
+            <a:ext cx="561340" cy="5080"/>
+          </a:xfrm>
+          <a:prstGeom prst="straightConnector1">
+            <a:avLst/>
+          </a:prstGeom>
+          <a:ln w="50800" cmpd="sng">
+            <a:solidFill>
+              <a:schemeClr val="bg1">
+                <a:lumMod val="65000"/>
+              </a:schemeClr>
+            </a:solidFill>
+            <a:prstDash val="solid"/>
+            <a:tailEnd type="triangle" w="med" len="lg"/>
+          </a:ln>
+        </p:spPr>
+        <p:style>
+          <a:lnRef idx="1">
+            <a:schemeClr val="accent1"/>
+          </a:lnRef>
+          <a:fillRef idx="0">
+            <a:schemeClr val="accent1"/>
+          </a:fillRef>
+          <a:effectRef idx="0">
+            <a:schemeClr val="accent1"/>
+          </a:effectRef>
+          <a:fontRef idx="minor">
+            <a:schemeClr val="tx1"/>
+          </a:fontRef>
+        </p:style>
+      </p:cxnSp>
+      <p:sp>
+        <p:nvSpPr>
+          <p:cNvPr id="30" name="Rectangle 29"/>
+          <p:cNvSpPr/>
+          <p:nvPr/>
+        </p:nvSpPr>
+        <p:spPr>
+          <a:xfrm>
+            <a:off x="6505575" y="4817745"/>
+            <a:ext cx="1269365" cy="584835"/>
+          </a:xfrm>
+          <a:prstGeom prst="rect">
+            <a:avLst/>
+          </a:prstGeom>
+        </p:spPr>
+        <p:style>
+          <a:lnRef idx="3">
+            <a:schemeClr val="lt1"/>
+          </a:lnRef>
+          <a:fillRef idx="1">
+            <a:schemeClr val="accent6"/>
+          </a:fillRef>
+          <a:effectRef idx="1">
+            <a:schemeClr val="accent6"/>
+          </a:effectRef>
+          <a:fontRef idx="minor">
+            <a:schemeClr val="lt1"/>
+          </a:fontRef>
+        </p:style>
+        <p:txBody>
+          <a:bodyPr rtlCol="0" anchor="ctr"/>
+          <a:p>
+            <a:pPr algn="ctr"/>
+            <a:endParaRPr lang="en-US" b="1">
+              <a:ln>
+                <a:noFill/>
+              </a:ln>
+            </a:endParaRPr>
+          </a:p>
+        </p:txBody>
+      </p:sp>
+      <p:sp>
+        <p:nvSpPr>
+          <p:cNvPr id="31" name="Text Box 30"/>
+          <p:cNvSpPr txBox="1"/>
+          <p:nvPr/>
+        </p:nvSpPr>
+        <p:spPr>
+          <a:xfrm>
+            <a:off x="6538595" y="4880610"/>
+            <a:ext cx="1202690" cy="460375"/>
+          </a:xfrm>
+          <a:prstGeom prst="rect">
+            <a:avLst/>
+          </a:prstGeom>
+          <a:noFill/>
+        </p:spPr>
+        <p:txBody>
+          <a:bodyPr wrap="square" rtlCol="0" anchor="t">
+            <a:spAutoFit/>
+          </a:bodyPr>
+          <a:p>
+            <a:r>
+              <a:rPr lang="en-US" altLang="zh-CN" sz="1200" b="1">
+                <a:solidFill>
+                  <a:schemeClr val="bg1"/>
+                </a:solidFill>
+                <a:latin typeface="微软雅黑" panose="020B0503020204020204" charset="-122"/>
+                <a:ea typeface="微软雅黑" panose="020B0503020204020204" charset="-122"/>
+              </a:rPr>
+              <a:t>Powder for 3D printing</a:t>
+            </a:r>
+            <a:endParaRPr lang="en-US" altLang="zh-CN" sz="1200" b="1">
+              <a:solidFill>
+                <a:schemeClr val="bg1"/>
+              </a:solidFill>
+              <a:latin typeface="微软雅黑" panose="020B0503020204020204" charset="-122"/>
+              <a:ea typeface="微软雅黑" panose="020B0503020204020204" charset="-122"/>
+            </a:endParaRPr>
+          </a:p>
+        </p:txBody>
+      </p:sp>
+      <p:cxnSp>
+        <p:nvCxnSpPr>
+          <p:cNvPr id="32" name="Straight Arrow Connector 31"/>
+          <p:cNvCxnSpPr/>
+          <p:nvPr/>
+        </p:nvCxnSpPr>
+        <p:spPr>
+          <a:xfrm>
+            <a:off x="5977255" y="5107940"/>
+            <a:ext cx="561340" cy="5080"/>
+          </a:xfrm>
+          <a:prstGeom prst="straightConnector1">
+            <a:avLst/>
+          </a:prstGeom>
+          <a:ln w="50800" cmpd="sng">
+            <a:solidFill>
+              <a:schemeClr val="bg1">
+                <a:lumMod val="65000"/>
+              </a:schemeClr>
+            </a:solidFill>
+            <a:prstDash val="solid"/>
+            <a:tailEnd type="triangle" w="med" len="lg"/>
+          </a:ln>
+        </p:spPr>
+        <p:style>
+          <a:lnRef idx="1">
+            <a:schemeClr val="accent1"/>
+          </a:lnRef>
+          <a:fillRef idx="0">
+            <a:schemeClr val="accent1"/>
+          </a:fillRef>
+          <a:effectRef idx="0">
+            <a:schemeClr val="accent1"/>
+          </a:effectRef>
+          <a:fontRef idx="minor">
+            <a:schemeClr val="tx1"/>
+          </a:fontRef>
+        </p:style>
+      </p:cxnSp>
+      <p:sp>
+        <p:nvSpPr>
+          <p:cNvPr id="33" name="Rectangle 32"/>
+          <p:cNvSpPr/>
+          <p:nvPr/>
+        </p:nvSpPr>
+        <p:spPr>
+          <a:xfrm>
+            <a:off x="8430260" y="4038600"/>
+            <a:ext cx="1269365" cy="584835"/>
+          </a:xfrm>
+          <a:prstGeom prst="rect">
+            <a:avLst/>
+          </a:prstGeom>
+        </p:spPr>
+        <p:style>
+          <a:lnRef idx="3">
+            <a:schemeClr val="lt1"/>
+          </a:lnRef>
+          <a:fillRef idx="1">
+            <a:schemeClr val="accent6"/>
+          </a:fillRef>
+          <a:effectRef idx="1">
+            <a:schemeClr val="accent6"/>
+          </a:effectRef>
+          <a:fontRef idx="minor">
+            <a:schemeClr val="lt1"/>
+          </a:fontRef>
+        </p:style>
+        <p:txBody>
+          <a:bodyPr rtlCol="0" anchor="ctr"/>
+          <a:p>
+            <a:pPr algn="ctr"/>
+            <a:endParaRPr lang="en-US" b="1">
+              <a:ln>
+                <a:noFill/>
+              </a:ln>
+            </a:endParaRPr>
+          </a:p>
+        </p:txBody>
+      </p:sp>
+      <p:sp>
+        <p:nvSpPr>
+          <p:cNvPr id="34" name="Text Box 33"/>
+          <p:cNvSpPr txBox="1"/>
+          <p:nvPr/>
+        </p:nvSpPr>
+        <p:spPr>
+          <a:xfrm>
+            <a:off x="8463280" y="4054475"/>
+            <a:ext cx="1202690" cy="521970"/>
+          </a:xfrm>
+          <a:prstGeom prst="rect">
+            <a:avLst/>
+          </a:prstGeom>
+          <a:noFill/>
+        </p:spPr>
+        <p:txBody>
+          <a:bodyPr wrap="square" rtlCol="0" anchor="t">
+            <a:spAutoFit/>
+          </a:bodyPr>
+          <a:p>
+            <a:r>
+              <a:rPr lang="en-US" altLang="zh-CN" sz="1400" b="1">
+                <a:solidFill>
+                  <a:schemeClr val="bg1"/>
+                </a:solidFill>
+                <a:latin typeface="微软雅黑" panose="020B0503020204020204" charset="-122"/>
+                <a:ea typeface="微软雅黑" panose="020B0503020204020204" charset="-122"/>
+              </a:rPr>
+              <a:t>Space cabin</a:t>
+            </a:r>
+            <a:endParaRPr lang="en-US" altLang="zh-CN" sz="1400" b="1">
+              <a:solidFill>
+                <a:schemeClr val="bg1"/>
+              </a:solidFill>
+              <a:latin typeface="微软雅黑" panose="020B0503020204020204" charset="-122"/>
+              <a:ea typeface="微软雅黑" panose="020B0503020204020204" charset="-122"/>
+            </a:endParaRPr>
+          </a:p>
+        </p:txBody>
+      </p:sp>
+      <p:cxnSp>
+        <p:nvCxnSpPr>
+          <p:cNvPr id="35" name="Straight Arrow Connector 34"/>
+          <p:cNvCxnSpPr/>
+          <p:nvPr/>
+        </p:nvCxnSpPr>
+        <p:spPr>
+          <a:xfrm>
+            <a:off x="7901940" y="4328795"/>
+            <a:ext cx="561340" cy="5080"/>
+          </a:xfrm>
+          <a:prstGeom prst="straightConnector1">
+            <a:avLst/>
+          </a:prstGeom>
+          <a:ln w="50800" cmpd="sng">
+            <a:solidFill>
+              <a:schemeClr val="bg1">
+                <a:lumMod val="65000"/>
+              </a:schemeClr>
+            </a:solidFill>
+            <a:prstDash val="solid"/>
+            <a:tailEnd type="triangle" w="med" len="lg"/>
+          </a:ln>
+        </p:spPr>
+        <p:style>
+          <a:lnRef idx="1">
+            <a:schemeClr val="accent1"/>
+          </a:lnRef>
+          <a:fillRef idx="0">
+            <a:schemeClr val="accent1"/>
+          </a:fillRef>
+          <a:effectRef idx="0">
+            <a:schemeClr val="accent1"/>
+          </a:effectRef>
+          <a:fontRef idx="minor">
+            <a:schemeClr val="tx1"/>
+          </a:fontRef>
+        </p:style>
+      </p:cxnSp>
+      <p:sp>
+        <p:nvSpPr>
+          <p:cNvPr id="36" name="Rectangle 35"/>
+          <p:cNvSpPr/>
+          <p:nvPr/>
+        </p:nvSpPr>
+        <p:spPr>
+          <a:xfrm>
+            <a:off x="8463280" y="4802505"/>
+            <a:ext cx="1269365" cy="584835"/>
+          </a:xfrm>
+          <a:prstGeom prst="rect">
+            <a:avLst/>
+          </a:prstGeom>
+        </p:spPr>
+        <p:style>
+          <a:lnRef idx="3">
+            <a:schemeClr val="lt1"/>
+          </a:lnRef>
+          <a:fillRef idx="1">
+            <a:schemeClr val="accent6"/>
+          </a:fillRef>
+          <a:effectRef idx="1">
+            <a:schemeClr val="accent6"/>
+          </a:effectRef>
+          <a:fontRef idx="minor">
+            <a:schemeClr val="lt1"/>
+          </a:fontRef>
+        </p:style>
+        <p:txBody>
+          <a:bodyPr rtlCol="0" anchor="ctr"/>
+          <a:p>
+            <a:pPr algn="ctr"/>
+            <a:endParaRPr lang="en-US" b="1">
+              <a:ln>
+                <a:noFill/>
+              </a:ln>
+            </a:endParaRPr>
+          </a:p>
+        </p:txBody>
+      </p:sp>
+      <p:sp>
+        <p:nvSpPr>
+          <p:cNvPr id="37" name="Text Box 36"/>
+          <p:cNvSpPr txBox="1"/>
+          <p:nvPr/>
+        </p:nvSpPr>
+        <p:spPr>
+          <a:xfrm>
+            <a:off x="8496300" y="4879975"/>
+            <a:ext cx="1202690" cy="460375"/>
+          </a:xfrm>
+          <a:prstGeom prst="rect">
+            <a:avLst/>
+          </a:prstGeom>
+          <a:noFill/>
+        </p:spPr>
+        <p:txBody>
+          <a:bodyPr wrap="square" rtlCol="0" anchor="t">
+            <a:spAutoFit/>
+          </a:bodyPr>
+          <a:p>
+            <a:r>
+              <a:rPr lang="en-US" altLang="zh-CN" sz="1200" b="1">
+                <a:solidFill>
+                  <a:schemeClr val="bg1"/>
+                </a:solidFill>
+                <a:latin typeface="微软雅黑" panose="020B0503020204020204" charset="-122"/>
+                <a:ea typeface="微软雅黑" panose="020B0503020204020204" charset="-122"/>
+              </a:rPr>
+              <a:t>Manipulate</a:t>
+            </a:r>
+            <a:endParaRPr lang="zh-CN" sz="1200" b="1">
+              <a:solidFill>
+                <a:schemeClr val="bg1"/>
+              </a:solidFill>
+              <a:latin typeface="微软雅黑" panose="020B0503020204020204" charset="-122"/>
+              <a:ea typeface="微软雅黑" panose="020B0503020204020204" charset="-122"/>
+            </a:endParaRPr>
+          </a:p>
+          <a:p>
+            <a:r>
+              <a:rPr lang="en-US" altLang="zh-CN" sz="1200" b="1">
+                <a:solidFill>
+                  <a:schemeClr val="bg1"/>
+                </a:solidFill>
+                <a:latin typeface="微软雅黑" panose="020B0503020204020204" charset="-122"/>
+                <a:ea typeface="微软雅黑" panose="020B0503020204020204" charset="-122"/>
+              </a:rPr>
+              <a:t>Robotics</a:t>
+            </a:r>
+            <a:endParaRPr lang="en-US" altLang="zh-CN" sz="1200" b="1">
+              <a:solidFill>
+                <a:schemeClr val="bg1"/>
+              </a:solidFill>
+              <a:latin typeface="微软雅黑" panose="020B0503020204020204" charset="-122"/>
+              <a:ea typeface="微软雅黑" panose="020B0503020204020204" charset="-122"/>
+            </a:endParaRPr>
+          </a:p>
+        </p:txBody>
+      </p:sp>
+      <p:cxnSp>
+        <p:nvCxnSpPr>
+          <p:cNvPr id="38" name="Straight Arrow Connector 37"/>
+          <p:cNvCxnSpPr/>
+          <p:nvPr/>
+        </p:nvCxnSpPr>
+        <p:spPr>
+          <a:xfrm>
+            <a:off x="7934960" y="5092700"/>
+            <a:ext cx="561340" cy="5080"/>
+          </a:xfrm>
+          <a:prstGeom prst="straightConnector1">
+            <a:avLst/>
+          </a:prstGeom>
+          <a:ln w="50800" cmpd="sng">
+            <a:solidFill>
+              <a:schemeClr val="bg1">
+                <a:lumMod val="65000"/>
+              </a:schemeClr>
+            </a:solidFill>
+            <a:prstDash val="solid"/>
+            <a:tailEnd type="triangle" w="med" len="lg"/>
+          </a:ln>
+        </p:spPr>
+        <p:style>
+          <a:lnRef idx="1">
+            <a:schemeClr val="accent1"/>
+          </a:lnRef>
+          <a:fillRef idx="0">
+            <a:schemeClr val="accent1"/>
+          </a:fillRef>
+          <a:effectRef idx="0">
+            <a:schemeClr val="accent1"/>
+          </a:effectRef>
+          <a:fontRef idx="minor">
+            <a:schemeClr val="tx1"/>
+          </a:fontRef>
+        </p:style>
+      </p:cxnSp>
+      <p:sp>
+        <p:nvSpPr>
+          <p:cNvPr id="39" name="Right Arrow 38"/>
+          <p:cNvSpPr/>
+          <p:nvPr/>
+        </p:nvSpPr>
+        <p:spPr>
+          <a:xfrm>
+            <a:off x="3399790" y="2218055"/>
+            <a:ext cx="306705" cy="501650"/>
+          </a:xfrm>
+          <a:prstGeom prst="rightArrow">
+            <a:avLst/>
+          </a:prstGeom>
+          <a:ln>
+            <a:noFill/>
+          </a:ln>
+        </p:spPr>
+        <p:style>
+          <a:lnRef idx="2">
+            <a:schemeClr val="accent3">
+              <a:shade val="50000"/>
+            </a:schemeClr>
+          </a:lnRef>
+          <a:fillRef idx="1">
+            <a:schemeClr val="accent3"/>
+          </a:fillRef>
+          <a:effectRef idx="0">
+            <a:schemeClr val="accent3"/>
+          </a:effectRef>
+          <a:fontRef idx="minor">
+            <a:schemeClr val="lt1"/>
+          </a:fontRef>
+        </p:style>
+        <p:txBody>
+          <a:bodyPr rtlCol="0" anchor="ctr"/>
+          <a:p>
+            <a:pPr algn="ctr"/>
+            <a:endParaRPr lang="en-US"/>
+          </a:p>
+        </p:txBody>
+      </p:sp>
+      <p:sp>
+        <p:nvSpPr>
+          <p:cNvPr id="40" name="Right Arrow 39"/>
+          <p:cNvSpPr/>
+          <p:nvPr/>
+        </p:nvSpPr>
+        <p:spPr>
+          <a:xfrm>
+            <a:off x="5257165" y="2219960"/>
+            <a:ext cx="306705" cy="501650"/>
+          </a:xfrm>
+          <a:prstGeom prst="rightArrow">
+            <a:avLst/>
+          </a:prstGeom>
+          <a:ln>
+            <a:noFill/>
+          </a:ln>
+        </p:spPr>
+        <p:style>
+          <a:lnRef idx="2">
+            <a:schemeClr val="accent3">
+              <a:shade val="50000"/>
+            </a:schemeClr>
+          </a:lnRef>
+          <a:fillRef idx="1">
+            <a:schemeClr val="accent3"/>
+          </a:fillRef>
+          <a:effectRef idx="0">
+            <a:schemeClr val="accent3"/>
+          </a:effectRef>
+          <a:fontRef idx="minor">
+            <a:schemeClr val="lt1"/>
+          </a:fontRef>
+        </p:style>
+        <p:txBody>
+          <a:bodyPr rtlCol="0" anchor="ctr"/>
+          <a:p>
+            <a:pPr algn="ctr"/>
+            <a:endParaRPr lang="en-US"/>
+          </a:p>
+        </p:txBody>
+      </p:sp>
+      <p:sp>
+        <p:nvSpPr>
+          <p:cNvPr id="41" name="Right Arrow 40"/>
+          <p:cNvSpPr/>
+          <p:nvPr/>
+        </p:nvSpPr>
+        <p:spPr>
+          <a:xfrm>
+            <a:off x="7106920" y="2218055"/>
+            <a:ext cx="306705" cy="501650"/>
+          </a:xfrm>
+          <a:prstGeom prst="rightArrow">
+            <a:avLst/>
+          </a:prstGeom>
+          <a:ln>
+            <a:noFill/>
+          </a:ln>
+        </p:spPr>
+        <p:style>
+          <a:lnRef idx="2">
+            <a:schemeClr val="accent3">
+              <a:shade val="50000"/>
+            </a:schemeClr>
+          </a:lnRef>
+          <a:fillRef idx="1">
+            <a:schemeClr val="accent3"/>
+          </a:fillRef>
+          <a:effectRef idx="0">
+            <a:schemeClr val="accent3"/>
+          </a:effectRef>
+          <a:fontRef idx="minor">
+            <a:schemeClr val="lt1"/>
+          </a:fontRef>
+        </p:style>
+        <p:txBody>
+          <a:bodyPr rtlCol="0" anchor="ctr"/>
+          <a:p>
+            <a:pPr algn="ctr"/>
+            <a:endParaRPr lang="en-US"/>
+          </a:p>
+        </p:txBody>
+      </p:sp>
+      <p:sp>
+        <p:nvSpPr>
+          <p:cNvPr id="42" name="Rectangle 41"/>
+          <p:cNvSpPr/>
+          <p:nvPr/>
+        </p:nvSpPr>
+        <p:spPr>
+          <a:xfrm>
+            <a:off x="1442085" y="3883025"/>
+            <a:ext cx="2793365" cy="1789430"/>
+          </a:xfrm>
+          <a:prstGeom prst="rect">
+            <a:avLst/>
+          </a:prstGeom>
+        </p:spPr>
+        <p:style>
+          <a:lnRef idx="3">
+            <a:schemeClr val="lt1"/>
+          </a:lnRef>
+          <a:fillRef idx="1">
+            <a:schemeClr val="accent3"/>
+          </a:fillRef>
+          <a:effectRef idx="1">
+            <a:schemeClr val="accent3"/>
+          </a:effectRef>
+          <a:fontRef idx="minor">
+            <a:schemeClr val="lt1"/>
+          </a:fontRef>
+        </p:style>
+        <p:txBody>
+          <a:bodyPr rtlCol="0" anchor="ctr"/>
+          <a:p>
+            <a:pPr algn="ctr"/>
+            <a:endParaRPr lang="en-US" b="1">
+              <a:ln>
+                <a:noFill/>
+              </a:ln>
+            </a:endParaRPr>
+          </a:p>
+        </p:txBody>
+      </p:sp>
+      <p:sp>
+        <p:nvSpPr>
+          <p:cNvPr id="43" name="Text Box 42"/>
+          <p:cNvSpPr txBox="1"/>
+          <p:nvPr/>
+        </p:nvSpPr>
+        <p:spPr>
+          <a:xfrm>
+            <a:off x="1511935" y="4270375"/>
+            <a:ext cx="2653030" cy="1014730"/>
+          </a:xfrm>
+          <a:prstGeom prst="rect">
+            <a:avLst/>
+          </a:prstGeom>
+          <a:noFill/>
+        </p:spPr>
+        <p:txBody>
+          <a:bodyPr wrap="square" rtlCol="0" anchor="t">
+            <a:spAutoFit/>
+          </a:bodyPr>
+          <a:p>
+            <a:r>
+              <a:rPr lang="en-US" altLang="zh-CN" sz="2000" b="1">
+                <a:solidFill>
+                  <a:schemeClr val="bg1"/>
+                </a:solidFill>
+                <a:latin typeface="微软雅黑" panose="020B0503020204020204" charset="-122"/>
+                <a:ea typeface="微软雅黑" panose="020B0503020204020204" charset="-122"/>
+              </a:rPr>
+              <a:t>Detect of </a:t>
+            </a:r>
+            <a:endParaRPr lang="en-US" altLang="zh-CN" sz="2000" b="1">
+              <a:solidFill>
+                <a:schemeClr val="bg1"/>
+              </a:solidFill>
+              <a:latin typeface="微软雅黑" panose="020B0503020204020204" charset="-122"/>
+              <a:ea typeface="微软雅黑" panose="020B0503020204020204" charset="-122"/>
+            </a:endParaRPr>
+          </a:p>
+          <a:p>
+            <a:r>
+              <a:rPr lang="en-US" altLang="zh-CN" sz="2000" b="1">
+                <a:solidFill>
+                  <a:schemeClr val="bg1"/>
+                </a:solidFill>
+                <a:latin typeface="微软雅黑" panose="020B0503020204020204" charset="-122"/>
+                <a:ea typeface="微软雅黑" panose="020B0503020204020204" charset="-122"/>
+              </a:rPr>
+              <a:t>asteroids and other target object</a:t>
+            </a:r>
+            <a:endParaRPr lang="zh-CN" sz="2000" b="1">
+              <a:solidFill>
+                <a:schemeClr val="bg1"/>
+              </a:solidFill>
+              <a:latin typeface="微软雅黑" panose="020B0503020204020204" charset="-122"/>
+              <a:ea typeface="微软雅黑" panose="020B0503020204020204" charset="-122"/>
+            </a:endParaRPr>
+          </a:p>
+        </p:txBody>
+      </p:sp>
+    </p:spTree>
+  </p:cSld>
+  <p:clrMapOvr>
+    <a:masterClrMapping/>
+  </p:clrMapOvr>
+</p:sld>
+</file>
+
 <file path=ppt/theme/theme1.xml><?xml version="1.0" encoding="utf-8"?>
 <a:theme xmlns:a="http://schemas.openxmlformats.org/drawingml/2006/main" name="Office Theme">
   <a:themeElements>

</xml_diff>